<commit_message>
Esta es la segunda version
</commit_message>
<xml_diff>
--- a/Versionamiento.pptx
+++ b/Versionamiento.pptx
@@ -6,6 +6,7 @@
   </p:sldMasterIdLst>
   <p:sldIdLst>
     <p:sldId id="256" r:id="rId2"/>
+    <p:sldId id="257" r:id="rId3"/>
   </p:sldIdLst>
   <p:sldSz cx="12192000" cy="6858000"/>
   <p:notesSz cx="6858000" cy="9144000"/>
@@ -104,6 +105,11 @@
       </a:defRPr>
     </a:lvl9pPr>
   </p:defaultTextStyle>
+  <p:extLst>
+    <p:ext uri="{EFAFB233-063F-42B5-8137-9DF3F51BA10A}">
+      <p15:sldGuideLst xmlns:p15="http://schemas.microsoft.com/office/powerpoint/2012/main"/>
+    </p:ext>
+  </p:extLst>
 </p:presentation>
 </file>
 
@@ -157,7 +163,7 @@
           <a:noFill/>
           <a:extLst>
             <a:ext uri="{909E8E84-426E-40dd-AFC4-6F175D3DCCD1}">
-              <a14:hiddenFill xmlns:a14="http://schemas.microsoft.com/office/drawing/2010/main" xmlns="">
+              <a14:hiddenFill xmlns="" xmlns:a14="http://schemas.microsoft.com/office/drawing/2010/main">
                 <a:solidFill>
                   <a:srgbClr val="FFFFFF"/>
                 </a:solidFill>
@@ -217,7 +223,7 @@
             </a:ln>
             <a:extLst>
               <a:ext uri="{91240B29-F687-4f45-9708-019B960494DF}">
-                <a14:hiddenLine xmlns:a14="http://schemas.microsoft.com/office/drawing/2010/main" xmlns="" w="9525">
+                <a14:hiddenLine xmlns="" xmlns:a14="http://schemas.microsoft.com/office/drawing/2010/main" w="9525">
                   <a:solidFill>
                     <a:srgbClr val="000000"/>
                   </a:solidFill>
@@ -307,7 +313,7 @@
             </a:ln>
             <a:extLst>
               <a:ext uri="{91240B29-F687-4f45-9708-019B960494DF}">
-                <a14:hiddenLine xmlns:a14="http://schemas.microsoft.com/office/drawing/2010/main" xmlns="" w="9525">
+                <a14:hiddenLine xmlns="" xmlns:a14="http://schemas.microsoft.com/office/drawing/2010/main" w="9525">
                   <a:solidFill>
                     <a:srgbClr val="000000"/>
                   </a:solidFill>
@@ -397,7 +403,7 @@
             </a:ln>
             <a:extLst>
               <a:ext uri="{91240B29-F687-4f45-9708-019B960494DF}">
-                <a14:hiddenLine xmlns:a14="http://schemas.microsoft.com/office/drawing/2010/main" xmlns="" w="9525">
+                <a14:hiddenLine xmlns="" xmlns:a14="http://schemas.microsoft.com/office/drawing/2010/main" w="9525">
                   <a:solidFill>
                     <a:srgbClr val="000000"/>
                   </a:solidFill>
@@ -431,7 +437,7 @@
             </a:ln>
             <a:extLst>
               <a:ext uri="{91240B29-F687-4f45-9708-019B960494DF}">
-                <a14:hiddenLine xmlns:a14="http://schemas.microsoft.com/office/drawing/2010/main" xmlns="" w="9525">
+                <a14:hiddenLine xmlns="" xmlns:a14="http://schemas.microsoft.com/office/drawing/2010/main" w="9525">
                   <a:solidFill>
                     <a:srgbClr val="000000"/>
                   </a:solidFill>
@@ -521,7 +527,7 @@
             </a:ln>
             <a:extLst>
               <a:ext uri="{91240B29-F687-4f45-9708-019B960494DF}">
-                <a14:hiddenLine xmlns:a14="http://schemas.microsoft.com/office/drawing/2010/main" xmlns="" w="9525">
+                <a14:hiddenLine xmlns="" xmlns:a14="http://schemas.microsoft.com/office/drawing/2010/main" w="9525">
                   <a:solidFill>
                     <a:srgbClr val="000000"/>
                   </a:solidFill>
@@ -583,7 +589,7 @@
             </a:ln>
             <a:extLst>
               <a:ext uri="{91240B29-F687-4f45-9708-019B960494DF}">
-                <a14:hiddenLine xmlns:a14="http://schemas.microsoft.com/office/drawing/2010/main" xmlns="" w="9525">
+                <a14:hiddenLine xmlns="" xmlns:a14="http://schemas.microsoft.com/office/drawing/2010/main" w="9525">
                   <a:solidFill>
                     <a:srgbClr val="000000"/>
                   </a:solidFill>
@@ -645,7 +651,7 @@
             </a:ln>
             <a:extLst>
               <a:ext uri="{91240B29-F687-4f45-9708-019B960494DF}">
-                <a14:hiddenLine xmlns:a14="http://schemas.microsoft.com/office/drawing/2010/main" xmlns="" w="9525">
+                <a14:hiddenLine xmlns="" xmlns:a14="http://schemas.microsoft.com/office/drawing/2010/main" w="9525">
                   <a:solidFill>
                     <a:srgbClr val="000000"/>
                   </a:solidFill>
@@ -735,7 +741,7 @@
             </a:ln>
             <a:extLst>
               <a:ext uri="{91240B29-F687-4f45-9708-019B960494DF}">
-                <a14:hiddenLine xmlns:a14="http://schemas.microsoft.com/office/drawing/2010/main" xmlns="" w="9525">
+                <a14:hiddenLine xmlns="" xmlns:a14="http://schemas.microsoft.com/office/drawing/2010/main" w="9525">
                   <a:solidFill>
                     <a:srgbClr val="000000"/>
                   </a:solidFill>
@@ -797,7 +803,7 @@
             </a:ln>
             <a:extLst>
               <a:ext uri="{91240B29-F687-4f45-9708-019B960494DF}">
-                <a14:hiddenLine xmlns:a14="http://schemas.microsoft.com/office/drawing/2010/main" xmlns="" w="9525">
+                <a14:hiddenLine xmlns="" xmlns:a14="http://schemas.microsoft.com/office/drawing/2010/main" w="9525">
                   <a:solidFill>
                     <a:srgbClr val="000000"/>
                   </a:solidFill>
@@ -859,7 +865,7 @@
             </a:ln>
             <a:extLst>
               <a:ext uri="{91240B29-F687-4f45-9708-019B960494DF}">
-                <a14:hiddenLine xmlns:a14="http://schemas.microsoft.com/office/drawing/2010/main" xmlns="" w="9525">
+                <a14:hiddenLine xmlns="" xmlns:a14="http://schemas.microsoft.com/office/drawing/2010/main" w="9525">
                   <a:solidFill>
                     <a:srgbClr val="000000"/>
                   </a:solidFill>
@@ -949,7 +955,7 @@
             </a:ln>
             <a:extLst>
               <a:ext uri="{91240B29-F687-4f45-9708-019B960494DF}">
-                <a14:hiddenLine xmlns:a14="http://schemas.microsoft.com/office/drawing/2010/main" xmlns="" w="9525">
+                <a14:hiddenLine xmlns="" xmlns:a14="http://schemas.microsoft.com/office/drawing/2010/main" w="9525">
                   <a:solidFill>
                     <a:srgbClr val="000000"/>
                   </a:solidFill>
@@ -1039,7 +1045,7 @@
             </a:ln>
             <a:extLst>
               <a:ext uri="{91240B29-F687-4f45-9708-019B960494DF}">
-                <a14:hiddenLine xmlns:a14="http://schemas.microsoft.com/office/drawing/2010/main" xmlns="" w="9525">
+                <a14:hiddenLine xmlns="" xmlns:a14="http://schemas.microsoft.com/office/drawing/2010/main" w="9525">
                   <a:solidFill>
                     <a:srgbClr val="000000"/>
                   </a:solidFill>
@@ -1101,7 +1107,7 @@
             </a:ln>
             <a:extLst>
               <a:ext uri="{91240B29-F687-4f45-9708-019B960494DF}">
-                <a14:hiddenLine xmlns:a14="http://schemas.microsoft.com/office/drawing/2010/main" xmlns="" w="9525">
+                <a14:hiddenLine xmlns="" xmlns:a14="http://schemas.microsoft.com/office/drawing/2010/main" w="9525">
                   <a:solidFill>
                     <a:srgbClr val="000000"/>
                   </a:solidFill>
@@ -1211,7 +1217,7 @@
             </a:ln>
             <a:extLst>
               <a:ext uri="{91240B29-F687-4f45-9708-019B960494DF}">
-                <a14:hiddenLine xmlns:a14="http://schemas.microsoft.com/office/drawing/2010/main" xmlns="" w="9525">
+                <a14:hiddenLine xmlns="" xmlns:a14="http://schemas.microsoft.com/office/drawing/2010/main" w="9525">
                   <a:solidFill>
                     <a:srgbClr val="000000"/>
                   </a:solidFill>
@@ -1273,7 +1279,7 @@
             </a:ln>
             <a:extLst>
               <a:ext uri="{91240B29-F687-4f45-9708-019B960494DF}">
-                <a14:hiddenLine xmlns:a14="http://schemas.microsoft.com/office/drawing/2010/main" xmlns="" w="9525">
+                <a14:hiddenLine xmlns="" xmlns:a14="http://schemas.microsoft.com/office/drawing/2010/main" w="9525">
                   <a:solidFill>
                     <a:srgbClr val="000000"/>
                   </a:solidFill>
@@ -1363,7 +1369,7 @@
             </a:ln>
             <a:extLst>
               <a:ext uri="{91240B29-F687-4f45-9708-019B960494DF}">
-                <a14:hiddenLine xmlns:a14="http://schemas.microsoft.com/office/drawing/2010/main" xmlns="" w="9525">
+                <a14:hiddenLine xmlns="" xmlns:a14="http://schemas.microsoft.com/office/drawing/2010/main" w="9525">
                   <a:solidFill>
                     <a:srgbClr val="000000"/>
                   </a:solidFill>
@@ -1453,7 +1459,7 @@
             </a:ln>
             <a:extLst>
               <a:ext uri="{91240B29-F687-4f45-9708-019B960494DF}">
-                <a14:hiddenLine xmlns:a14="http://schemas.microsoft.com/office/drawing/2010/main" xmlns="" w="9525">
+                <a14:hiddenLine xmlns="" xmlns:a14="http://schemas.microsoft.com/office/drawing/2010/main" w="9525">
                   <a:solidFill>
                     <a:srgbClr val="000000"/>
                   </a:solidFill>
@@ -1515,7 +1521,7 @@
             </a:ln>
             <a:extLst>
               <a:ext uri="{91240B29-F687-4f45-9708-019B960494DF}">
-                <a14:hiddenLine xmlns:a14="http://schemas.microsoft.com/office/drawing/2010/main" xmlns="" w="9525">
+                <a14:hiddenLine xmlns="" xmlns:a14="http://schemas.microsoft.com/office/drawing/2010/main" w="9525">
                   <a:solidFill>
                     <a:srgbClr val="000000"/>
                   </a:solidFill>
@@ -1605,7 +1611,7 @@
             </a:ln>
             <a:extLst>
               <a:ext uri="{91240B29-F687-4f45-9708-019B960494DF}">
-                <a14:hiddenLine xmlns:a14="http://schemas.microsoft.com/office/drawing/2010/main" xmlns="" w="9525">
+                <a14:hiddenLine xmlns="" xmlns:a14="http://schemas.microsoft.com/office/drawing/2010/main" w="9525">
                   <a:solidFill>
                     <a:srgbClr val="000000"/>
                   </a:solidFill>
@@ -1695,7 +1701,7 @@
             </a:ln>
             <a:extLst>
               <a:ext uri="{91240B29-F687-4f45-9708-019B960494DF}">
-                <a14:hiddenLine xmlns:a14="http://schemas.microsoft.com/office/drawing/2010/main" xmlns="" w="9525">
+                <a14:hiddenLine xmlns="" xmlns:a14="http://schemas.microsoft.com/office/drawing/2010/main" w="9525">
                   <a:solidFill>
                     <a:srgbClr val="000000"/>
                   </a:solidFill>
@@ -1751,7 +1757,7 @@
             </a:ln>
             <a:extLst>
               <a:ext uri="{91240B29-F687-4f45-9708-019B960494DF}">
-                <a14:hiddenLine xmlns:a14="http://schemas.microsoft.com/office/drawing/2010/main" xmlns="" w="9525">
+                <a14:hiddenLine xmlns="" xmlns:a14="http://schemas.microsoft.com/office/drawing/2010/main" w="9525">
                   <a:solidFill>
                     <a:srgbClr val="000000"/>
                   </a:solidFill>
@@ -1841,7 +1847,7 @@
             </a:ln>
             <a:extLst>
               <a:ext uri="{91240B29-F687-4f45-9708-019B960494DF}">
-                <a14:hiddenLine xmlns:a14="http://schemas.microsoft.com/office/drawing/2010/main" xmlns="" w="9525">
+                <a14:hiddenLine xmlns="" xmlns:a14="http://schemas.microsoft.com/office/drawing/2010/main" w="9525">
                   <a:solidFill>
                     <a:srgbClr val="000000"/>
                   </a:solidFill>
@@ -1897,7 +1903,7 @@
             </a:ln>
             <a:extLst>
               <a:ext uri="{91240B29-F687-4f45-9708-019B960494DF}">
-                <a14:hiddenLine xmlns:a14="http://schemas.microsoft.com/office/drawing/2010/main" xmlns="" w="9525">
+                <a14:hiddenLine xmlns="" xmlns:a14="http://schemas.microsoft.com/office/drawing/2010/main" w="9525">
                   <a:solidFill>
                     <a:srgbClr val="000000"/>
                   </a:solidFill>
@@ -1987,7 +1993,7 @@
             </a:ln>
             <a:extLst>
               <a:ext uri="{91240B29-F687-4f45-9708-019B960494DF}">
-                <a14:hiddenLine xmlns:a14="http://schemas.microsoft.com/office/drawing/2010/main" xmlns="" w="9525">
+                <a14:hiddenLine xmlns="" xmlns:a14="http://schemas.microsoft.com/office/drawing/2010/main" w="9525">
                   <a:solidFill>
                     <a:srgbClr val="000000"/>
                   </a:solidFill>
@@ -2055,7 +2061,7 @@
             </a:ln>
             <a:extLst>
               <a:ext uri="{91240B29-F687-4f45-9708-019B960494DF}">
-                <a14:hiddenLine xmlns:a14="http://schemas.microsoft.com/office/drawing/2010/main" xmlns="" w="9525">
+                <a14:hiddenLine xmlns="" xmlns:a14="http://schemas.microsoft.com/office/drawing/2010/main" w="9525">
                   <a:solidFill>
                     <a:srgbClr val="000000"/>
                   </a:solidFill>
@@ -2145,7 +2151,7 @@
             </a:ln>
             <a:extLst>
               <a:ext uri="{91240B29-F687-4f45-9708-019B960494DF}">
-                <a14:hiddenLine xmlns:a14="http://schemas.microsoft.com/office/drawing/2010/main" xmlns="" w="9525">
+                <a14:hiddenLine xmlns="" xmlns:a14="http://schemas.microsoft.com/office/drawing/2010/main" w="9525">
                   <a:solidFill>
                     <a:srgbClr val="000000"/>
                   </a:solidFill>
@@ -2213,7 +2219,7 @@
             </a:ln>
             <a:extLst>
               <a:ext uri="{91240B29-F687-4f45-9708-019B960494DF}">
-                <a14:hiddenLine xmlns:a14="http://schemas.microsoft.com/office/drawing/2010/main" xmlns="" w="9525">
+                <a14:hiddenLine xmlns="" xmlns:a14="http://schemas.microsoft.com/office/drawing/2010/main" w="9525">
                   <a:solidFill>
                     <a:srgbClr val="000000"/>
                   </a:solidFill>
@@ -2303,7 +2309,7 @@
             </a:ln>
             <a:extLst>
               <a:ext uri="{91240B29-F687-4f45-9708-019B960494DF}">
-                <a14:hiddenLine xmlns:a14="http://schemas.microsoft.com/office/drawing/2010/main" xmlns="" w="9525">
+                <a14:hiddenLine xmlns="" xmlns:a14="http://schemas.microsoft.com/office/drawing/2010/main" w="9525">
                   <a:solidFill>
                     <a:srgbClr val="000000"/>
                   </a:solidFill>
@@ -2337,7 +2343,7 @@
             </a:ln>
             <a:extLst>
               <a:ext uri="{91240B29-F687-4f45-9708-019B960494DF}">
-                <a14:hiddenLine xmlns:a14="http://schemas.microsoft.com/office/drawing/2010/main" xmlns="" w="9525">
+                <a14:hiddenLine xmlns="" xmlns:a14="http://schemas.microsoft.com/office/drawing/2010/main" w="9525">
                   <a:solidFill>
                     <a:srgbClr val="000000"/>
                   </a:solidFill>
@@ -2427,7 +2433,7 @@
             </a:ln>
             <a:extLst>
               <a:ext uri="{91240B29-F687-4f45-9708-019B960494DF}">
-                <a14:hiddenLine xmlns:a14="http://schemas.microsoft.com/office/drawing/2010/main" xmlns="" w="9525">
+                <a14:hiddenLine xmlns="" xmlns:a14="http://schemas.microsoft.com/office/drawing/2010/main" w="9525">
                   <a:solidFill>
                     <a:srgbClr val="000000"/>
                   </a:solidFill>
@@ -2489,7 +2495,7 @@
             </a:ln>
             <a:extLst>
               <a:ext uri="{91240B29-F687-4f45-9708-019B960494DF}">
-                <a14:hiddenLine xmlns:a14="http://schemas.microsoft.com/office/drawing/2010/main" xmlns="" w="9525">
+                <a14:hiddenLine xmlns="" xmlns:a14="http://schemas.microsoft.com/office/drawing/2010/main" w="9525">
                   <a:solidFill>
                     <a:srgbClr val="000000"/>
                   </a:solidFill>
@@ -2551,7 +2557,7 @@
             </a:ln>
             <a:extLst>
               <a:ext uri="{91240B29-F687-4f45-9708-019B960494DF}">
-                <a14:hiddenLine xmlns:a14="http://schemas.microsoft.com/office/drawing/2010/main" xmlns="" w="9525">
+                <a14:hiddenLine xmlns="" xmlns:a14="http://schemas.microsoft.com/office/drawing/2010/main" w="9525">
                   <a:solidFill>
                     <a:srgbClr val="000000"/>
                   </a:solidFill>
@@ -2641,7 +2647,7 @@
             </a:ln>
             <a:extLst>
               <a:ext uri="{91240B29-F687-4f45-9708-019B960494DF}">
-                <a14:hiddenLine xmlns:a14="http://schemas.microsoft.com/office/drawing/2010/main" xmlns="" w="9525">
+                <a14:hiddenLine xmlns="" xmlns:a14="http://schemas.microsoft.com/office/drawing/2010/main" w="9525">
                   <a:solidFill>
                     <a:srgbClr val="000000"/>
                   </a:solidFill>
@@ -2709,7 +2715,7 @@
             </a:ln>
             <a:extLst>
               <a:ext uri="{91240B29-F687-4f45-9708-019B960494DF}">
-                <a14:hiddenLine xmlns:a14="http://schemas.microsoft.com/office/drawing/2010/main" xmlns="" w="9525">
+                <a14:hiddenLine xmlns="" xmlns:a14="http://schemas.microsoft.com/office/drawing/2010/main" w="9525">
                   <a:solidFill>
                     <a:srgbClr val="000000"/>
                   </a:solidFill>
@@ -2771,7 +2777,7 @@
             </a:ln>
             <a:extLst>
               <a:ext uri="{91240B29-F687-4f45-9708-019B960494DF}">
-                <a14:hiddenLine xmlns:a14="http://schemas.microsoft.com/office/drawing/2010/main" xmlns="" w="9525">
+                <a14:hiddenLine xmlns="" xmlns:a14="http://schemas.microsoft.com/office/drawing/2010/main" w="9525">
                   <a:solidFill>
                     <a:srgbClr val="000000"/>
                   </a:solidFill>
@@ -2861,7 +2867,7 @@
             </a:ln>
             <a:extLst>
               <a:ext uri="{91240B29-F687-4f45-9708-019B960494DF}">
-                <a14:hiddenLine xmlns:a14="http://schemas.microsoft.com/office/drawing/2010/main" xmlns="" w="9525">
+                <a14:hiddenLine xmlns="" xmlns:a14="http://schemas.microsoft.com/office/drawing/2010/main" w="9525">
                   <a:solidFill>
                     <a:srgbClr val="000000"/>
                   </a:solidFill>
@@ -2923,7 +2929,7 @@
             </a:ln>
             <a:extLst>
               <a:ext uri="{91240B29-F687-4f45-9708-019B960494DF}">
-                <a14:hiddenLine xmlns:a14="http://schemas.microsoft.com/office/drawing/2010/main" xmlns="" w="9525">
+                <a14:hiddenLine xmlns="" xmlns:a14="http://schemas.microsoft.com/office/drawing/2010/main" w="9525">
                   <a:solidFill>
                     <a:srgbClr val="000000"/>
                   </a:solidFill>
@@ -3013,7 +3019,7 @@
             </a:ln>
             <a:extLst>
               <a:ext uri="{91240B29-F687-4f45-9708-019B960494DF}">
-                <a14:hiddenLine xmlns:a14="http://schemas.microsoft.com/office/drawing/2010/main" xmlns="" w="9525">
+                <a14:hiddenLine xmlns="" xmlns:a14="http://schemas.microsoft.com/office/drawing/2010/main" w="9525">
                   <a:solidFill>
                     <a:srgbClr val="000000"/>
                   </a:solidFill>
@@ -3075,7 +3081,7 @@
             </a:ln>
             <a:extLst>
               <a:ext uri="{91240B29-F687-4f45-9708-019B960494DF}">
-                <a14:hiddenLine xmlns:a14="http://schemas.microsoft.com/office/drawing/2010/main" xmlns="" w="9525">
+                <a14:hiddenLine xmlns="" xmlns:a14="http://schemas.microsoft.com/office/drawing/2010/main" w="9525">
                   <a:solidFill>
                     <a:srgbClr val="000000"/>
                   </a:solidFill>
@@ -3165,7 +3171,7 @@
             </a:ln>
             <a:extLst>
               <a:ext uri="{91240B29-F687-4f45-9708-019B960494DF}">
-                <a14:hiddenLine xmlns:a14="http://schemas.microsoft.com/office/drawing/2010/main" xmlns="" w="9525">
+                <a14:hiddenLine xmlns="" xmlns:a14="http://schemas.microsoft.com/office/drawing/2010/main" w="9525">
                   <a:solidFill>
                     <a:srgbClr val="000000"/>
                   </a:solidFill>
@@ -3199,7 +3205,7 @@
             </a:ln>
             <a:extLst>
               <a:ext uri="{91240B29-F687-4f45-9708-019B960494DF}">
-                <a14:hiddenLine xmlns:a14="http://schemas.microsoft.com/office/drawing/2010/main" xmlns="" w="9525">
+                <a14:hiddenLine xmlns="" xmlns:a14="http://schemas.microsoft.com/office/drawing/2010/main" w="9525">
                   <a:solidFill>
                     <a:srgbClr val="000000"/>
                   </a:solidFill>
@@ -3264,7 +3270,7 @@
             </a:ln>
             <a:extLst>
               <a:ext uri="{91240B29-F687-4f45-9708-019B960494DF}">
-                <a14:hiddenLine xmlns:a14="http://schemas.microsoft.com/office/drawing/2010/main" xmlns="" w="9525">
+                <a14:hiddenLine xmlns="" xmlns:a14="http://schemas.microsoft.com/office/drawing/2010/main" w="9525">
                   <a:solidFill>
                     <a:srgbClr val="000000"/>
                   </a:solidFill>
@@ -3354,7 +3360,7 @@
             </a:ln>
             <a:extLst>
               <a:ext uri="{91240B29-F687-4f45-9708-019B960494DF}">
-                <a14:hiddenLine xmlns:a14="http://schemas.microsoft.com/office/drawing/2010/main" xmlns="" w="9525">
+                <a14:hiddenLine xmlns="" xmlns:a14="http://schemas.microsoft.com/office/drawing/2010/main" w="9525">
                   <a:solidFill>
                     <a:srgbClr val="000000"/>
                   </a:solidFill>
@@ -3416,7 +3422,7 @@
             </a:ln>
             <a:extLst>
               <a:ext uri="{91240B29-F687-4f45-9708-019B960494DF}">
-                <a14:hiddenLine xmlns:a14="http://schemas.microsoft.com/office/drawing/2010/main" xmlns="" w="9525">
+                <a14:hiddenLine xmlns="" xmlns:a14="http://schemas.microsoft.com/office/drawing/2010/main" w="9525">
                   <a:solidFill>
                     <a:srgbClr val="000000"/>
                   </a:solidFill>
@@ -3506,7 +3512,7 @@
             </a:ln>
             <a:extLst>
               <a:ext uri="{91240B29-F687-4f45-9708-019B960494DF}">
-                <a14:hiddenLine xmlns:a14="http://schemas.microsoft.com/office/drawing/2010/main" xmlns="" w="9525">
+                <a14:hiddenLine xmlns="" xmlns:a14="http://schemas.microsoft.com/office/drawing/2010/main" w="9525">
                   <a:solidFill>
                     <a:srgbClr val="000000"/>
                   </a:solidFill>
@@ -3596,7 +3602,7 @@
             </a:ln>
             <a:extLst>
               <a:ext uri="{91240B29-F687-4f45-9708-019B960494DF}">
-                <a14:hiddenLine xmlns:a14="http://schemas.microsoft.com/office/drawing/2010/main" xmlns="" w="9525">
+                <a14:hiddenLine xmlns="" xmlns:a14="http://schemas.microsoft.com/office/drawing/2010/main" w="9525">
                   <a:solidFill>
                     <a:srgbClr val="000000"/>
                   </a:solidFill>
@@ -3661,7 +3667,7 @@
             </a:ln>
             <a:extLst>
               <a:ext uri="{91240B29-F687-4f45-9708-019B960494DF}">
-                <a14:hiddenLine xmlns:a14="http://schemas.microsoft.com/office/drawing/2010/main" xmlns="" w="9525">
+                <a14:hiddenLine xmlns="" xmlns:a14="http://schemas.microsoft.com/office/drawing/2010/main" w="9525">
                   <a:solidFill>
                     <a:srgbClr val="000000"/>
                   </a:solidFill>
@@ -3723,7 +3729,7 @@
             </a:ln>
             <a:extLst>
               <a:ext uri="{91240B29-F687-4f45-9708-019B960494DF}">
-                <a14:hiddenLine xmlns:a14="http://schemas.microsoft.com/office/drawing/2010/main" xmlns="" w="9525">
+                <a14:hiddenLine xmlns="" xmlns:a14="http://schemas.microsoft.com/office/drawing/2010/main" w="9525">
                   <a:solidFill>
                     <a:srgbClr val="000000"/>
                   </a:solidFill>
@@ -3813,7 +3819,7 @@
             </a:ln>
             <a:extLst>
               <a:ext uri="{91240B29-F687-4f45-9708-019B960494DF}">
-                <a14:hiddenLine xmlns:a14="http://schemas.microsoft.com/office/drawing/2010/main" xmlns="" w="9525">
+                <a14:hiddenLine xmlns="" xmlns:a14="http://schemas.microsoft.com/office/drawing/2010/main" w="9525">
                   <a:solidFill>
                     <a:srgbClr val="000000"/>
                   </a:solidFill>
@@ -3903,7 +3909,7 @@
             </a:ln>
             <a:extLst>
               <a:ext uri="{91240B29-F687-4f45-9708-019B960494DF}">
-                <a14:hiddenLine xmlns:a14="http://schemas.microsoft.com/office/drawing/2010/main" xmlns="" w="9525">
+                <a14:hiddenLine xmlns="" xmlns:a14="http://schemas.microsoft.com/office/drawing/2010/main" w="9525">
                   <a:solidFill>
                     <a:srgbClr val="000000"/>
                   </a:solidFill>
@@ -3965,7 +3971,7 @@
             </a:ln>
             <a:extLst>
               <a:ext uri="{91240B29-F687-4f45-9708-019B960494DF}">
-                <a14:hiddenLine xmlns:a14="http://schemas.microsoft.com/office/drawing/2010/main" xmlns="" w="9525">
+                <a14:hiddenLine xmlns="" xmlns:a14="http://schemas.microsoft.com/office/drawing/2010/main" w="9525">
                   <a:solidFill>
                     <a:srgbClr val="000000"/>
                   </a:solidFill>
@@ -4085,7 +4091,7 @@
             </a:ln>
             <a:extLst>
               <a:ext uri="{91240B29-F687-4f45-9708-019B960494DF}">
-                <a14:hiddenLine xmlns:a14="http://schemas.microsoft.com/office/drawing/2010/main" xmlns="" w="9525">
+                <a14:hiddenLine xmlns="" xmlns:a14="http://schemas.microsoft.com/office/drawing/2010/main" w="9525">
                   <a:solidFill>
                     <a:srgbClr val="000000"/>
                   </a:solidFill>
@@ -4153,7 +4159,7 @@
             </a:ln>
             <a:extLst>
               <a:ext uri="{91240B29-F687-4f45-9708-019B960494DF}">
-                <a14:hiddenLine xmlns:a14="http://schemas.microsoft.com/office/drawing/2010/main" xmlns="" w="9525">
+                <a14:hiddenLine xmlns="" xmlns:a14="http://schemas.microsoft.com/office/drawing/2010/main" w="9525">
                   <a:solidFill>
                     <a:srgbClr val="000000"/>
                   </a:solidFill>
@@ -4243,7 +4249,7 @@
             </a:ln>
             <a:extLst>
               <a:ext uri="{91240B29-F687-4f45-9708-019B960494DF}">
-                <a14:hiddenLine xmlns:a14="http://schemas.microsoft.com/office/drawing/2010/main" xmlns="" w="9525">
+                <a14:hiddenLine xmlns="" xmlns:a14="http://schemas.microsoft.com/office/drawing/2010/main" w="9525">
                   <a:solidFill>
                     <a:srgbClr val="000000"/>
                   </a:solidFill>
@@ -9050,7 +9056,7 @@
           <a:noFill/>
           <a:extLst>
             <a:ext uri="{909E8E84-426E-40dd-AFC4-6F175D3DCCD1}">
-              <a14:hiddenFill xmlns:a14="http://schemas.microsoft.com/office/drawing/2010/main" xmlns="">
+              <a14:hiddenFill xmlns="" xmlns:a14="http://schemas.microsoft.com/office/drawing/2010/main">
                 <a:solidFill>
                   <a:srgbClr val="FFFFFF"/>
                 </a:solidFill>
@@ -9124,7 +9130,7 @@
               </a:ln>
               <a:extLst>
                 <a:ext uri="{91240B29-F687-4f45-9708-019B960494DF}">
-                  <a14:hiddenLine xmlns:a14="http://schemas.microsoft.com/office/drawing/2010/main" xmlns="" w="9525">
+                  <a14:hiddenLine xmlns="" xmlns:a14="http://schemas.microsoft.com/office/drawing/2010/main" w="9525">
                     <a:solidFill>
                       <a:srgbClr val="000000"/>
                     </a:solidFill>
@@ -9214,7 +9220,7 @@
               </a:ln>
               <a:extLst>
                 <a:ext uri="{91240B29-F687-4f45-9708-019B960494DF}">
-                  <a14:hiddenLine xmlns:a14="http://schemas.microsoft.com/office/drawing/2010/main" xmlns="" w="9525">
+                  <a14:hiddenLine xmlns="" xmlns:a14="http://schemas.microsoft.com/office/drawing/2010/main" w="9525">
                     <a:solidFill>
                       <a:srgbClr val="000000"/>
                     </a:solidFill>
@@ -9304,7 +9310,7 @@
               </a:ln>
               <a:extLst>
                 <a:ext uri="{91240B29-F687-4f45-9708-019B960494DF}">
-                  <a14:hiddenLine xmlns:a14="http://schemas.microsoft.com/office/drawing/2010/main" xmlns="" w="9525">
+                  <a14:hiddenLine xmlns="" xmlns:a14="http://schemas.microsoft.com/office/drawing/2010/main" w="9525">
                     <a:solidFill>
                       <a:srgbClr val="000000"/>
                     </a:solidFill>
@@ -9366,7 +9372,7 @@
               </a:ln>
               <a:extLst>
                 <a:ext uri="{91240B29-F687-4f45-9708-019B960494DF}">
-                  <a14:hiddenLine xmlns:a14="http://schemas.microsoft.com/office/drawing/2010/main" xmlns="" w="9525">
+                  <a14:hiddenLine xmlns="" xmlns:a14="http://schemas.microsoft.com/office/drawing/2010/main" w="9525">
                     <a:solidFill>
                       <a:srgbClr val="000000"/>
                     </a:solidFill>
@@ -9456,7 +9462,7 @@
               </a:ln>
               <a:extLst>
                 <a:ext uri="{91240B29-F687-4f45-9708-019B960494DF}">
-                  <a14:hiddenLine xmlns:a14="http://schemas.microsoft.com/office/drawing/2010/main" xmlns="" w="9525">
+                  <a14:hiddenLine xmlns="" xmlns:a14="http://schemas.microsoft.com/office/drawing/2010/main" w="9525">
                     <a:solidFill>
                       <a:srgbClr val="000000"/>
                     </a:solidFill>
@@ -9518,7 +9524,7 @@
               </a:ln>
               <a:extLst>
                 <a:ext uri="{91240B29-F687-4f45-9708-019B960494DF}">
-                  <a14:hiddenLine xmlns:a14="http://schemas.microsoft.com/office/drawing/2010/main" xmlns="" w="9525">
+                  <a14:hiddenLine xmlns="" xmlns:a14="http://schemas.microsoft.com/office/drawing/2010/main" w="9525">
                     <a:solidFill>
                       <a:srgbClr val="000000"/>
                     </a:solidFill>
@@ -9580,7 +9586,7 @@
               </a:ln>
               <a:extLst>
                 <a:ext uri="{91240B29-F687-4f45-9708-019B960494DF}">
-                  <a14:hiddenLine xmlns:a14="http://schemas.microsoft.com/office/drawing/2010/main" xmlns="" w="9525">
+                  <a14:hiddenLine xmlns="" xmlns:a14="http://schemas.microsoft.com/office/drawing/2010/main" w="9525">
                     <a:solidFill>
                       <a:srgbClr val="000000"/>
                     </a:solidFill>
@@ -9670,7 +9676,7 @@
               </a:ln>
               <a:extLst>
                 <a:ext uri="{91240B29-F687-4f45-9708-019B960494DF}">
-                  <a14:hiddenLine xmlns:a14="http://schemas.microsoft.com/office/drawing/2010/main" xmlns="" w="9525">
+                  <a14:hiddenLine xmlns="" xmlns:a14="http://schemas.microsoft.com/office/drawing/2010/main" w="9525">
                     <a:solidFill>
                       <a:srgbClr val="000000"/>
                     </a:solidFill>
@@ -9760,7 +9766,7 @@
               </a:ln>
               <a:extLst>
                 <a:ext uri="{91240B29-F687-4f45-9708-019B960494DF}">
-                  <a14:hiddenLine xmlns:a14="http://schemas.microsoft.com/office/drawing/2010/main" xmlns="" w="9525">
+                  <a14:hiddenLine xmlns="" xmlns:a14="http://schemas.microsoft.com/office/drawing/2010/main" w="9525">
                     <a:solidFill>
                       <a:srgbClr val="000000"/>
                     </a:solidFill>
@@ -9822,7 +9828,7 @@
               </a:ln>
               <a:extLst>
                 <a:ext uri="{91240B29-F687-4f45-9708-019B960494DF}">
-                  <a14:hiddenLine xmlns:a14="http://schemas.microsoft.com/office/drawing/2010/main" xmlns="" w="9525">
+                  <a14:hiddenLine xmlns="" xmlns:a14="http://schemas.microsoft.com/office/drawing/2010/main" w="9525">
                     <a:solidFill>
                       <a:srgbClr val="000000"/>
                     </a:solidFill>
@@ -9932,7 +9938,7 @@
               </a:ln>
               <a:extLst>
                 <a:ext uri="{91240B29-F687-4f45-9708-019B960494DF}">
-                  <a14:hiddenLine xmlns:a14="http://schemas.microsoft.com/office/drawing/2010/main" xmlns="" w="9525">
+                  <a14:hiddenLine xmlns="" xmlns:a14="http://schemas.microsoft.com/office/drawing/2010/main" w="9525">
                     <a:solidFill>
                       <a:srgbClr val="000000"/>
                     </a:solidFill>
@@ -10016,7 +10022,7 @@
               </a:ln>
               <a:extLst>
                 <a:ext uri="{91240B29-F687-4f45-9708-019B960494DF}">
-                  <a14:hiddenLine xmlns:a14="http://schemas.microsoft.com/office/drawing/2010/main" xmlns="" w="9525">
+                  <a14:hiddenLine xmlns="" xmlns:a14="http://schemas.microsoft.com/office/drawing/2010/main" w="9525">
                     <a:solidFill>
                       <a:srgbClr val="000000"/>
                     </a:solidFill>
@@ -10078,7 +10084,7 @@
               </a:ln>
               <a:extLst>
                 <a:ext uri="{91240B29-F687-4f45-9708-019B960494DF}">
-                  <a14:hiddenLine xmlns:a14="http://schemas.microsoft.com/office/drawing/2010/main" xmlns="" w="9525">
+                  <a14:hiddenLine xmlns="" xmlns:a14="http://schemas.microsoft.com/office/drawing/2010/main" w="9525">
                     <a:solidFill>
                       <a:srgbClr val="000000"/>
                     </a:solidFill>
@@ -10140,7 +10146,7 @@
               </a:ln>
               <a:extLst>
                 <a:ext uri="{91240B29-F687-4f45-9708-019B960494DF}">
-                  <a14:hiddenLine xmlns:a14="http://schemas.microsoft.com/office/drawing/2010/main" xmlns="" w="9525">
+                  <a14:hiddenLine xmlns="" xmlns:a14="http://schemas.microsoft.com/office/drawing/2010/main" w="9525">
                     <a:solidFill>
                       <a:srgbClr val="000000"/>
                     </a:solidFill>
@@ -10230,7 +10236,7 @@
               </a:ln>
               <a:extLst>
                 <a:ext uri="{91240B29-F687-4f45-9708-019B960494DF}">
-                  <a14:hiddenLine xmlns:a14="http://schemas.microsoft.com/office/drawing/2010/main" xmlns="" w="9525">
+                  <a14:hiddenLine xmlns="" xmlns:a14="http://schemas.microsoft.com/office/drawing/2010/main" w="9525">
                     <a:solidFill>
                       <a:srgbClr val="000000"/>
                     </a:solidFill>
@@ -10264,7 +10270,7 @@
               </a:ln>
               <a:extLst>
                 <a:ext uri="{91240B29-F687-4f45-9708-019B960494DF}">
-                  <a14:hiddenLine xmlns:a14="http://schemas.microsoft.com/office/drawing/2010/main" xmlns="" w="9525">
+                  <a14:hiddenLine xmlns="" xmlns:a14="http://schemas.microsoft.com/office/drawing/2010/main" w="9525">
                     <a:solidFill>
                       <a:srgbClr val="000000"/>
                     </a:solidFill>
@@ -10329,7 +10335,7 @@
               </a:ln>
               <a:extLst>
                 <a:ext uri="{91240B29-F687-4f45-9708-019B960494DF}">
-                  <a14:hiddenLine xmlns:a14="http://schemas.microsoft.com/office/drawing/2010/main" xmlns="" w="9525">
+                  <a14:hiddenLine xmlns="" xmlns:a14="http://schemas.microsoft.com/office/drawing/2010/main" w="9525">
                     <a:solidFill>
                       <a:srgbClr val="000000"/>
                     </a:solidFill>
@@ -10419,7 +10425,7 @@
               </a:ln>
               <a:extLst>
                 <a:ext uri="{91240B29-F687-4f45-9708-019B960494DF}">
-                  <a14:hiddenLine xmlns:a14="http://schemas.microsoft.com/office/drawing/2010/main" xmlns="" w="9525">
+                  <a14:hiddenLine xmlns="" xmlns:a14="http://schemas.microsoft.com/office/drawing/2010/main" w="9525">
                     <a:solidFill>
                       <a:srgbClr val="000000"/>
                     </a:solidFill>
@@ -10481,7 +10487,7 @@
               </a:ln>
               <a:extLst>
                 <a:ext uri="{91240B29-F687-4f45-9708-019B960494DF}">
-                  <a14:hiddenLine xmlns:a14="http://schemas.microsoft.com/office/drawing/2010/main" xmlns="" w="9525">
+                  <a14:hiddenLine xmlns="" xmlns:a14="http://schemas.microsoft.com/office/drawing/2010/main" w="9525">
                     <a:solidFill>
                       <a:srgbClr val="000000"/>
                     </a:solidFill>
@@ -10571,7 +10577,7 @@
               </a:ln>
               <a:extLst>
                 <a:ext uri="{91240B29-F687-4f45-9708-019B960494DF}">
-                  <a14:hiddenLine xmlns:a14="http://schemas.microsoft.com/office/drawing/2010/main" xmlns="" w="9525">
+                  <a14:hiddenLine xmlns="" xmlns:a14="http://schemas.microsoft.com/office/drawing/2010/main" w="9525">
                     <a:solidFill>
                       <a:srgbClr val="000000"/>
                     </a:solidFill>
@@ -10636,7 +10642,7 @@
               </a:ln>
               <a:extLst>
                 <a:ext uri="{91240B29-F687-4f45-9708-019B960494DF}">
-                  <a14:hiddenLine xmlns:a14="http://schemas.microsoft.com/office/drawing/2010/main" xmlns="" w="9525">
+                  <a14:hiddenLine xmlns="" xmlns:a14="http://schemas.microsoft.com/office/drawing/2010/main" w="9525">
                     <a:solidFill>
                       <a:srgbClr val="000000"/>
                     </a:solidFill>
@@ -10698,7 +10704,7 @@
               </a:ln>
               <a:extLst>
                 <a:ext uri="{91240B29-F687-4f45-9708-019B960494DF}">
-                  <a14:hiddenLine xmlns:a14="http://schemas.microsoft.com/office/drawing/2010/main" xmlns="" w="9525">
+                  <a14:hiddenLine xmlns="" xmlns:a14="http://schemas.microsoft.com/office/drawing/2010/main" w="9525">
                     <a:solidFill>
                       <a:srgbClr val="000000"/>
                     </a:solidFill>
@@ -10788,7 +10794,7 @@
               </a:ln>
               <a:extLst>
                 <a:ext uri="{91240B29-F687-4f45-9708-019B960494DF}">
-                  <a14:hiddenLine xmlns:a14="http://schemas.microsoft.com/office/drawing/2010/main" xmlns="" w="9525">
+                  <a14:hiddenLine xmlns="" xmlns:a14="http://schemas.microsoft.com/office/drawing/2010/main" w="9525">
                     <a:solidFill>
                       <a:srgbClr val="000000"/>
                     </a:solidFill>
@@ -10878,7 +10884,7 @@
               </a:ln>
               <a:extLst>
                 <a:ext uri="{91240B29-F687-4f45-9708-019B960494DF}">
-                  <a14:hiddenLine xmlns:a14="http://schemas.microsoft.com/office/drawing/2010/main" xmlns="" w="9525">
+                  <a14:hiddenLine xmlns="" xmlns:a14="http://schemas.microsoft.com/office/drawing/2010/main" w="9525">
                     <a:solidFill>
                       <a:srgbClr val="000000"/>
                     </a:solidFill>
@@ -10943,7 +10949,7 @@
               </a:ln>
               <a:extLst>
                 <a:ext uri="{91240B29-F687-4f45-9708-019B960494DF}">
-                  <a14:hiddenLine xmlns:a14="http://schemas.microsoft.com/office/drawing/2010/main" xmlns="" w="9525">
+                  <a14:hiddenLine xmlns="" xmlns:a14="http://schemas.microsoft.com/office/drawing/2010/main" w="9525">
                     <a:solidFill>
                       <a:srgbClr val="000000"/>
                     </a:solidFill>
@@ -11063,7 +11069,7 @@
               </a:ln>
               <a:extLst>
                 <a:ext uri="{91240B29-F687-4f45-9708-019B960494DF}">
-                  <a14:hiddenLine xmlns:a14="http://schemas.microsoft.com/office/drawing/2010/main" xmlns="" w="9525">
+                  <a14:hiddenLine xmlns="" xmlns:a14="http://schemas.microsoft.com/office/drawing/2010/main" w="9525">
                     <a:solidFill>
                       <a:srgbClr val="000000"/>
                     </a:solidFill>
@@ -11161,7 +11167,7 @@
               </a:ln>
               <a:extLst>
                 <a:ext uri="{91240B29-F687-4f45-9708-019B960494DF}">
-                  <a14:hiddenLine xmlns:a14="http://schemas.microsoft.com/office/drawing/2010/main" xmlns="" w="9525">
+                  <a14:hiddenLine xmlns="" xmlns:a14="http://schemas.microsoft.com/office/drawing/2010/main" w="9525">
                     <a:solidFill>
                       <a:srgbClr val="000000"/>
                     </a:solidFill>
@@ -11276,7 +11282,7 @@
               </a:ln>
               <a:extLst>
                 <a:ext uri="{91240B29-F687-4f45-9708-019B960494DF}">
-                  <a14:hiddenLine xmlns:a14="http://schemas.microsoft.com/office/drawing/2010/main" xmlns="" w="9525">
+                  <a14:hiddenLine xmlns="" xmlns:a14="http://schemas.microsoft.com/office/drawing/2010/main" w="9525">
                     <a:solidFill>
                       <a:srgbClr val="000000"/>
                     </a:solidFill>
@@ -11366,7 +11372,7 @@
               </a:ln>
               <a:extLst>
                 <a:ext uri="{91240B29-F687-4f45-9708-019B960494DF}">
-                  <a14:hiddenLine xmlns:a14="http://schemas.microsoft.com/office/drawing/2010/main" xmlns="" w="9525">
+                  <a14:hiddenLine xmlns="" xmlns:a14="http://schemas.microsoft.com/office/drawing/2010/main" w="9525">
                     <a:solidFill>
                       <a:srgbClr val="000000"/>
                     </a:solidFill>
@@ -11431,7 +11437,7 @@
               </a:ln>
               <a:extLst>
                 <a:ext uri="{91240B29-F687-4f45-9708-019B960494DF}">
-                  <a14:hiddenLine xmlns:a14="http://schemas.microsoft.com/office/drawing/2010/main" xmlns="" w="9525">
+                  <a14:hiddenLine xmlns="" xmlns:a14="http://schemas.microsoft.com/office/drawing/2010/main" w="9525">
                     <a:solidFill>
                       <a:srgbClr val="000000"/>
                     </a:solidFill>
@@ -11521,7 +11527,7 @@
               </a:ln>
               <a:extLst>
                 <a:ext uri="{91240B29-F687-4f45-9708-019B960494DF}">
-                  <a14:hiddenLine xmlns:a14="http://schemas.microsoft.com/office/drawing/2010/main" xmlns="" w="9525">
+                  <a14:hiddenLine xmlns="" xmlns:a14="http://schemas.microsoft.com/office/drawing/2010/main" w="9525">
                     <a:solidFill>
                       <a:srgbClr val="000000"/>
                     </a:solidFill>
@@ -11589,7 +11595,7 @@
               </a:ln>
               <a:extLst>
                 <a:ext uri="{91240B29-F687-4f45-9708-019B960494DF}">
-                  <a14:hiddenLine xmlns:a14="http://schemas.microsoft.com/office/drawing/2010/main" xmlns="" w="9525">
+                  <a14:hiddenLine xmlns="" xmlns:a14="http://schemas.microsoft.com/office/drawing/2010/main" w="9525">
                     <a:solidFill>
                       <a:srgbClr val="000000"/>
                     </a:solidFill>
@@ -11679,7 +11685,7 @@
               </a:ln>
               <a:extLst>
                 <a:ext uri="{91240B29-F687-4f45-9708-019B960494DF}">
-                  <a14:hiddenLine xmlns:a14="http://schemas.microsoft.com/office/drawing/2010/main" xmlns="" w="9525">
+                  <a14:hiddenLine xmlns="" xmlns:a14="http://schemas.microsoft.com/office/drawing/2010/main" w="9525">
                     <a:solidFill>
                       <a:srgbClr val="000000"/>
                     </a:solidFill>
@@ -11747,7 +11753,7 @@
               </a:ln>
               <a:extLst>
                 <a:ext uri="{91240B29-F687-4f45-9708-019B960494DF}">
-                  <a14:hiddenLine xmlns:a14="http://schemas.microsoft.com/office/drawing/2010/main" xmlns="" w="9525">
+                  <a14:hiddenLine xmlns="" xmlns:a14="http://schemas.microsoft.com/office/drawing/2010/main" w="9525">
                     <a:solidFill>
                       <a:srgbClr val="000000"/>
                     </a:solidFill>
@@ -11837,7 +11843,7 @@
               </a:ln>
               <a:extLst>
                 <a:ext uri="{91240B29-F687-4f45-9708-019B960494DF}">
-                  <a14:hiddenLine xmlns:a14="http://schemas.microsoft.com/office/drawing/2010/main" xmlns="" w="9525">
+                  <a14:hiddenLine xmlns="" xmlns:a14="http://schemas.microsoft.com/office/drawing/2010/main" w="9525">
                     <a:solidFill>
                       <a:srgbClr val="000000"/>
                     </a:solidFill>
@@ -11871,7 +11877,7 @@
               </a:ln>
               <a:extLst>
                 <a:ext uri="{91240B29-F687-4f45-9708-019B960494DF}">
-                  <a14:hiddenLine xmlns:a14="http://schemas.microsoft.com/office/drawing/2010/main" xmlns="" w="9525">
+                  <a14:hiddenLine xmlns="" xmlns:a14="http://schemas.microsoft.com/office/drawing/2010/main" w="9525">
                     <a:solidFill>
                       <a:srgbClr val="000000"/>
                     </a:solidFill>
@@ -12499,6 +12505,88 @@
 </p:sld>
 </file>
 
+<file path=ppt/slides/slide2.xml><?xml version="1.0" encoding="utf-8"?>
+<p:sld xmlns:a="http://schemas.openxmlformats.org/drawingml/2006/main" xmlns:r="http://schemas.openxmlformats.org/officeDocument/2006/relationships" xmlns:p="http://schemas.openxmlformats.org/presentationml/2006/main">
+  <p:cSld>
+    <p:spTree>
+      <p:nvGrpSpPr>
+        <p:cNvPr id="1" name=""/>
+        <p:cNvGrpSpPr/>
+        <p:nvPr/>
+      </p:nvGrpSpPr>
+      <p:grpSpPr>
+        <a:xfrm>
+          <a:off x="0" y="0"/>
+          <a:ext cx="0" cy="0"/>
+          <a:chOff x="0" y="0"/>
+          <a:chExt cx="0" cy="0"/>
+        </a:xfrm>
+      </p:grpSpPr>
+      <p:sp>
+        <p:nvSpPr>
+          <p:cNvPr id="2" name="Título 1"/>
+          <p:cNvSpPr>
+            <a:spLocks noGrp="1"/>
+          </p:cNvSpPr>
+          <p:nvPr>
+            <p:ph type="title"/>
+          </p:nvPr>
+        </p:nvSpPr>
+        <p:spPr/>
+        <p:txBody>
+          <a:bodyPr/>
+          <a:lstStyle/>
+          <a:p>
+            <a:r>
+              <a:rPr lang="es-GT" dirty="0" smtClean="0"/>
+              <a:t>PRIMER VERSION	</a:t>
+            </a:r>
+            <a:endParaRPr lang="en-US" dirty="0"/>
+          </a:p>
+        </p:txBody>
+      </p:sp>
+      <p:sp>
+        <p:nvSpPr>
+          <p:cNvPr id="3" name="Marcador de contenido 2"/>
+          <p:cNvSpPr>
+            <a:spLocks noGrp="1"/>
+          </p:cNvSpPr>
+          <p:nvPr>
+            <p:ph idx="1"/>
+          </p:nvPr>
+        </p:nvSpPr>
+        <p:spPr/>
+        <p:txBody>
+          <a:bodyPr/>
+          <a:lstStyle/>
+          <a:p>
+            <a:r>
+              <a:rPr lang="es-GT" dirty="0" smtClean="0"/>
+              <a:t>GIT INIT </a:t>
+            </a:r>
+          </a:p>
+          <a:p>
+            <a:r>
+              <a:rPr lang="es-ES"/>
+              <a:t>Este comando se usa para crear un nuevo repertorio GIT:</a:t>
+            </a:r>
+            <a:endParaRPr lang="en-US" dirty="0"/>
+          </a:p>
+        </p:txBody>
+      </p:sp>
+    </p:spTree>
+    <p:extLst>
+      <p:ext uri="{BB962C8B-B14F-4D97-AF65-F5344CB8AC3E}">
+        <p14:creationId xmlns:p14="http://schemas.microsoft.com/office/powerpoint/2010/main" val="2727302914"/>
+      </p:ext>
+    </p:extLst>
+  </p:cSld>
+  <p:clrMapOvr>
+    <a:masterClrMapping/>
+  </p:clrMapOvr>
+</p:sld>
+</file>
+
 <file path=ppt/theme/theme1.xml><?xml version="1.0" encoding="utf-8"?>
 <a:theme xmlns:a="http://schemas.openxmlformats.org/drawingml/2006/main" name="Circuito">
   <a:themeElements>

</xml_diff>

<commit_message>
Esta es la Tercera Version
</commit_message>
<xml_diff>
--- a/Versionamiento.pptx
+++ b/Versionamiento.pptx
@@ -8,6 +8,7 @@
     <p:sldId id="256" r:id="rId2"/>
     <p:sldId id="257" r:id="rId3"/>
     <p:sldId id="258" r:id="rId4"/>
+    <p:sldId id="259" r:id="rId5"/>
   </p:sldIdLst>
   <p:sldSz cx="12192000" cy="6858000"/>
   <p:notesSz cx="6858000" cy="9144000"/>
@@ -12622,11 +12623,7 @@
           <a:p>
             <a:r>
               <a:rPr lang="es-GT" dirty="0" smtClean="0"/>
-              <a:t>Segunda </a:t>
-            </a:r>
-            <a:r>
-              <a:rPr lang="es-GT" dirty="0" err="1" smtClean="0"/>
-              <a:t>Version</a:t>
+              <a:t>Segunda Versión</a:t>
             </a:r>
             <a:endParaRPr lang="en-US" dirty="0"/>
           </a:p>
@@ -12683,7 +12680,7 @@
               <a:t>index</a:t>
             </a:r>
             <a:r>
-              <a:rPr lang="es-ES"/>
+              <a:rPr lang="es-ES" dirty="0"/>
               <a:t>:</a:t>
             </a:r>
           </a:p>
@@ -12693,6 +12690,100 @@
     <p:extLst>
       <p:ext uri="{BB962C8B-B14F-4D97-AF65-F5344CB8AC3E}">
         <p14:creationId xmlns:p14="http://schemas.microsoft.com/office/powerpoint/2010/main" val="3306643124"/>
+      </p:ext>
+    </p:extLst>
+  </p:cSld>
+  <p:clrMapOvr>
+    <a:masterClrMapping/>
+  </p:clrMapOvr>
+</p:sld>
+</file>
+
+<file path=ppt/slides/slide4.xml><?xml version="1.0" encoding="utf-8"?>
+<p:sld xmlns:a="http://schemas.openxmlformats.org/drawingml/2006/main" xmlns:r="http://schemas.openxmlformats.org/officeDocument/2006/relationships" xmlns:p="http://schemas.openxmlformats.org/presentationml/2006/main">
+  <p:cSld>
+    <p:spTree>
+      <p:nvGrpSpPr>
+        <p:cNvPr id="1" name=""/>
+        <p:cNvGrpSpPr/>
+        <p:nvPr/>
+      </p:nvGrpSpPr>
+      <p:grpSpPr>
+        <a:xfrm>
+          <a:off x="0" y="0"/>
+          <a:ext cx="0" cy="0"/>
+          <a:chOff x="0" y="0"/>
+          <a:chExt cx="0" cy="0"/>
+        </a:xfrm>
+      </p:grpSpPr>
+      <p:sp>
+        <p:nvSpPr>
+          <p:cNvPr id="2" name="Título 1"/>
+          <p:cNvSpPr>
+            <a:spLocks noGrp="1"/>
+          </p:cNvSpPr>
+          <p:nvPr>
+            <p:ph type="title"/>
+          </p:nvPr>
+        </p:nvSpPr>
+        <p:spPr/>
+        <p:txBody>
+          <a:bodyPr/>
+          <a:lstStyle/>
+          <a:p>
+            <a:r>
+              <a:rPr lang="es-GT" dirty="0" smtClean="0"/>
+              <a:t>Tercera versión	</a:t>
+            </a:r>
+            <a:endParaRPr lang="en-US" dirty="0"/>
+          </a:p>
+        </p:txBody>
+      </p:sp>
+      <p:sp>
+        <p:nvSpPr>
+          <p:cNvPr id="3" name="Marcador de contenido 2"/>
+          <p:cNvSpPr>
+            <a:spLocks noGrp="1"/>
+          </p:cNvSpPr>
+          <p:nvPr>
+            <p:ph idx="1"/>
+          </p:nvPr>
+        </p:nvSpPr>
+        <p:spPr/>
+        <p:txBody>
+          <a:bodyPr/>
+          <a:lstStyle/>
+          <a:p>
+            <a:r>
+              <a:rPr lang="es-ES" b="1" dirty="0" err="1"/>
+              <a:t>git</a:t>
+            </a:r>
+            <a:r>
+              <a:rPr lang="es-ES" b="1" dirty="0"/>
+              <a:t> clone</a:t>
+            </a:r>
+            <a:r>
+              <a:rPr lang="es-ES" dirty="0"/>
+              <a:t/>
+            </a:r>
+            <a:br>
+              <a:rPr lang="es-ES" dirty="0"/>
+            </a:br>
+            <a:r>
+              <a:rPr lang="es-ES" dirty="0"/>
+              <a:t>Este comando se usa con el propósito de revisar repertorios. </a:t>
+            </a:r>
+            <a:r>
+              <a:rPr lang="es-ES"/>
+              <a:t>Si el repertorio está en un servidor remoto se tiene que usar el siguiente comando:</a:t>
+            </a:r>
+          </a:p>
+        </p:txBody>
+      </p:sp>
+    </p:spTree>
+    <p:extLst>
+      <p:ext uri="{BB962C8B-B14F-4D97-AF65-F5344CB8AC3E}">
+        <p14:creationId xmlns:p14="http://schemas.microsoft.com/office/powerpoint/2010/main" val="3677616092"/>
       </p:ext>
     </p:extLst>
   </p:cSld>

</xml_diff>

<commit_message>
Esta es la cuarta Version del documento
</commit_message>
<xml_diff>
--- a/Versionamiento.pptx
+++ b/Versionamiento.pptx
@@ -9,6 +9,7 @@
     <p:sldId id="257" r:id="rId3"/>
     <p:sldId id="258" r:id="rId4"/>
     <p:sldId id="259" r:id="rId5"/>
+    <p:sldId id="260" r:id="rId6"/>
   </p:sldIdLst>
   <p:sldSz cx="12192000" cy="6858000"/>
   <p:notesSz cx="6858000" cy="9144000"/>
@@ -12771,11 +12772,7 @@
             </a:br>
             <a:r>
               <a:rPr lang="es-ES" dirty="0"/>
-              <a:t>Este comando se usa con el propósito de revisar repertorios. </a:t>
-            </a:r>
-            <a:r>
-              <a:rPr lang="es-ES"/>
-              <a:t>Si el repertorio está en un servidor remoto se tiene que usar el siguiente comando:</a:t>
+              <a:t>Este comando se usa con el propósito de revisar repertorios. Si el repertorio está en un servidor remoto se tiene que usar el siguiente comando:</a:t>
             </a:r>
           </a:p>
         </p:txBody>
@@ -12784,6 +12781,113 @@
     <p:extLst>
       <p:ext uri="{BB962C8B-B14F-4D97-AF65-F5344CB8AC3E}">
         <p14:creationId xmlns:p14="http://schemas.microsoft.com/office/powerpoint/2010/main" val="3677616092"/>
+      </p:ext>
+    </p:extLst>
+  </p:cSld>
+  <p:clrMapOvr>
+    <a:masterClrMapping/>
+  </p:clrMapOvr>
+</p:sld>
+</file>
+
+<file path=ppt/slides/slide5.xml><?xml version="1.0" encoding="utf-8"?>
+<p:sld xmlns:a="http://schemas.openxmlformats.org/drawingml/2006/main" xmlns:r="http://schemas.openxmlformats.org/officeDocument/2006/relationships" xmlns:p="http://schemas.openxmlformats.org/presentationml/2006/main">
+  <p:cSld>
+    <p:spTree>
+      <p:nvGrpSpPr>
+        <p:cNvPr id="1" name=""/>
+        <p:cNvGrpSpPr/>
+        <p:nvPr/>
+      </p:nvGrpSpPr>
+      <p:grpSpPr>
+        <a:xfrm>
+          <a:off x="0" y="0"/>
+          <a:ext cx="0" cy="0"/>
+          <a:chOff x="0" y="0"/>
+          <a:chExt cx="0" cy="0"/>
+        </a:xfrm>
+      </p:grpSpPr>
+      <p:sp>
+        <p:nvSpPr>
+          <p:cNvPr id="2" name="Título 1"/>
+          <p:cNvSpPr>
+            <a:spLocks noGrp="1"/>
+          </p:cNvSpPr>
+          <p:nvPr>
+            <p:ph type="title"/>
+          </p:nvPr>
+        </p:nvSpPr>
+        <p:spPr/>
+        <p:txBody>
+          <a:bodyPr/>
+          <a:lstStyle/>
+          <a:p>
+            <a:r>
+              <a:rPr lang="es-GT" dirty="0" smtClean="0"/>
+              <a:t>Cuarta versión 	</a:t>
+            </a:r>
+            <a:endParaRPr lang="en-US" dirty="0"/>
+          </a:p>
+        </p:txBody>
+      </p:sp>
+      <p:sp>
+        <p:nvSpPr>
+          <p:cNvPr id="3" name="Marcador de contenido 2"/>
+          <p:cNvSpPr>
+            <a:spLocks noGrp="1"/>
+          </p:cNvSpPr>
+          <p:nvPr>
+            <p:ph idx="1"/>
+          </p:nvPr>
+        </p:nvSpPr>
+        <p:spPr/>
+        <p:txBody>
+          <a:bodyPr/>
+          <a:lstStyle/>
+          <a:p>
+            <a:r>
+              <a:rPr lang="es-ES" b="1" dirty="0" err="1"/>
+              <a:t>git</a:t>
+            </a:r>
+            <a:r>
+              <a:rPr lang="es-ES" b="1" dirty="0"/>
+              <a:t> </a:t>
+            </a:r>
+            <a:r>
+              <a:rPr lang="es-ES" b="1" dirty="0" err="1"/>
+              <a:t>commit</a:t>
+            </a:r>
+            <a:r>
+              <a:rPr lang="es-ES" dirty="0"/>
+              <a:t/>
+            </a:r>
+            <a:br>
+              <a:rPr lang="es-ES" dirty="0"/>
+            </a:br>
+            <a:r>
+              <a:rPr lang="es-ES" dirty="0"/>
+              <a:t>El comando </a:t>
+            </a:r>
+            <a:r>
+              <a:rPr lang="es-ES" dirty="0" err="1"/>
+              <a:t>commit</a:t>
+            </a:r>
+            <a:r>
+              <a:rPr lang="es-ES" dirty="0"/>
+              <a:t> es usado para cambiar a la cabecera. Ten en cuenta que cualquier cambio comprometido no afectara al repertorio remoto. </a:t>
+            </a:r>
+            <a:r>
+              <a:rPr lang="es-ES"/>
+              <a:t>Usa el comando:</a:t>
+            </a:r>
+            <a:endParaRPr lang="en-US"/>
+          </a:p>
+        </p:txBody>
+      </p:sp>
+    </p:spTree>
+    <p:extLst>
+      <p:ext uri="{BB962C8B-B14F-4D97-AF65-F5344CB8AC3E}">
+        <p14:creationId xmlns:p14="http://schemas.microsoft.com/office/powerpoint/2010/main" val="732933829"/>
       </p:ext>
     </p:extLst>
   </p:cSld>

</xml_diff>

<commit_message>
Esta es la quinta y utlima version cargada
</commit_message>
<xml_diff>
--- a/Versionamiento.pptx
+++ b/Versionamiento.pptx
@@ -10,6 +10,7 @@
     <p:sldId id="258" r:id="rId4"/>
     <p:sldId id="259" r:id="rId5"/>
     <p:sldId id="260" r:id="rId6"/>
+    <p:sldId id="261" r:id="rId7"/>
   </p:sldIdLst>
   <p:sldSz cx="12192000" cy="6858000"/>
   <p:notesSz cx="6858000" cy="9144000"/>
@@ -12874,13 +12875,9 @@
             </a:r>
             <a:r>
               <a:rPr lang="es-ES" dirty="0"/>
-              <a:t> es usado para cambiar a la cabecera. Ten en cuenta que cualquier cambio comprometido no afectara al repertorio remoto. </a:t>
+              <a:t> es usado para cambiar a la cabecera. Ten en cuenta que cualquier cambio comprometido no afectara al repertorio remoto. Usa el comando:</a:t>
             </a:r>
-            <a:r>
-              <a:rPr lang="es-ES"/>
-              <a:t>Usa el comando:</a:t>
-            </a:r>
-            <a:endParaRPr lang="en-US"/>
+            <a:endParaRPr lang="en-US" dirty="0"/>
           </a:p>
         </p:txBody>
       </p:sp>
@@ -12888,6 +12885,96 @@
     <p:extLst>
       <p:ext uri="{BB962C8B-B14F-4D97-AF65-F5344CB8AC3E}">
         <p14:creationId xmlns:p14="http://schemas.microsoft.com/office/powerpoint/2010/main" val="732933829"/>
+      </p:ext>
+    </p:extLst>
+  </p:cSld>
+  <p:clrMapOvr>
+    <a:masterClrMapping/>
+  </p:clrMapOvr>
+</p:sld>
+</file>
+
+<file path=ppt/slides/slide6.xml><?xml version="1.0" encoding="utf-8"?>
+<p:sld xmlns:a="http://schemas.openxmlformats.org/drawingml/2006/main" xmlns:r="http://schemas.openxmlformats.org/officeDocument/2006/relationships" xmlns:p="http://schemas.openxmlformats.org/presentationml/2006/main">
+  <p:cSld>
+    <p:spTree>
+      <p:nvGrpSpPr>
+        <p:cNvPr id="1" name=""/>
+        <p:cNvGrpSpPr/>
+        <p:nvPr/>
+      </p:nvGrpSpPr>
+      <p:grpSpPr>
+        <a:xfrm>
+          <a:off x="0" y="0"/>
+          <a:ext cx="0" cy="0"/>
+          <a:chOff x="0" y="0"/>
+          <a:chExt cx="0" cy="0"/>
+        </a:xfrm>
+      </p:grpSpPr>
+      <p:sp>
+        <p:nvSpPr>
+          <p:cNvPr id="2" name="Título 1"/>
+          <p:cNvSpPr>
+            <a:spLocks noGrp="1"/>
+          </p:cNvSpPr>
+          <p:nvPr>
+            <p:ph type="title"/>
+          </p:nvPr>
+        </p:nvSpPr>
+        <p:spPr/>
+        <p:txBody>
+          <a:bodyPr/>
+          <a:lstStyle/>
+          <a:p>
+            <a:r>
+              <a:rPr lang="es-GT" dirty="0" smtClean="0"/>
+              <a:t>Quinta versión </a:t>
+            </a:r>
+            <a:endParaRPr lang="en-US" dirty="0"/>
+          </a:p>
+        </p:txBody>
+      </p:sp>
+      <p:sp>
+        <p:nvSpPr>
+          <p:cNvPr id="3" name="Marcador de contenido 2"/>
+          <p:cNvSpPr>
+            <a:spLocks noGrp="1"/>
+          </p:cNvSpPr>
+          <p:nvPr>
+            <p:ph idx="1"/>
+          </p:nvPr>
+        </p:nvSpPr>
+        <p:spPr/>
+        <p:txBody>
+          <a:bodyPr/>
+          <a:lstStyle/>
+          <a:p>
+            <a:r>
+              <a:rPr lang="es-ES" b="1" dirty="0" err="1"/>
+              <a:t>git</a:t>
+            </a:r>
+            <a:r>
+              <a:rPr lang="es-ES" b="1" dirty="0"/>
+              <a:t> status</a:t>
+            </a:r>
+            <a:r>
+              <a:rPr lang="es-ES" dirty="0"/>
+              <a:t/>
+            </a:r>
+            <a:br>
+              <a:rPr lang="es-ES" dirty="0"/>
+            </a:br>
+            <a:r>
+              <a:rPr lang="es-ES" dirty="0"/>
+              <a:t>Este comando muestra la lista de los archivos que se han cambiado junto con los archivos que están por ser añadidos o comprometidos.</a:t>
+            </a:r>
+          </a:p>
+        </p:txBody>
+      </p:sp>
+    </p:spTree>
+    <p:extLst>
+      <p:ext uri="{BB962C8B-B14F-4D97-AF65-F5344CB8AC3E}">
+        <p14:creationId xmlns:p14="http://schemas.microsoft.com/office/powerpoint/2010/main" val="3268837956"/>
       </p:ext>
     </p:extLst>
   </p:cSld>

</xml_diff>